<commit_message>
update repo structure for submission with final code
</commit_message>
<xml_diff>
--- a/presentation/West Nile Virus Prediction.pptx
+++ b/presentation/West Nile Virus Prediction.pptx
@@ -14,9 +14,10 @@
     <p:sldId id="263" r:id="rId8"/>
     <p:sldId id="266" r:id="rId9"/>
     <p:sldId id="265" r:id="rId10"/>
-    <p:sldId id="260" r:id="rId11"/>
-    <p:sldId id="261" r:id="rId12"/>
-    <p:sldId id="262" r:id="rId13"/>
+    <p:sldId id="268" r:id="rId11"/>
+    <p:sldId id="260" r:id="rId12"/>
+    <p:sldId id="261" r:id="rId13"/>
+    <p:sldId id="262" r:id="rId14"/>
   </p:sldIdLst>
   <p:sldSz cx="12192000" cy="6858000"/>
   <p:notesSz cx="6858000" cy="9144000"/>
@@ -270,7 +271,7 @@
           <a:p>
             <a:fld id="{D3250C7F-393C-42B5-920A-81DE1868480F}" type="datetimeFigureOut">
               <a:rPr lang="en-US" smtClean="0"/>
-              <a:t>24-Nov-23</a:t>
+              <a:t>26-Nov-23</a:t>
             </a:fld>
             <a:endParaRPr lang="en-US"/>
           </a:p>
@@ -468,7 +469,7 @@
           <a:p>
             <a:fld id="{D3250C7F-393C-42B5-920A-81DE1868480F}" type="datetimeFigureOut">
               <a:rPr lang="en-US" smtClean="0"/>
-              <a:t>24-Nov-23</a:t>
+              <a:t>26-Nov-23</a:t>
             </a:fld>
             <a:endParaRPr lang="en-US"/>
           </a:p>
@@ -676,7 +677,7 @@
           <a:p>
             <a:fld id="{D3250C7F-393C-42B5-920A-81DE1868480F}" type="datetimeFigureOut">
               <a:rPr lang="en-US" smtClean="0"/>
-              <a:t>24-Nov-23</a:t>
+              <a:t>26-Nov-23</a:t>
             </a:fld>
             <a:endParaRPr lang="en-US"/>
           </a:p>
@@ -874,7 +875,7 @@
           <a:p>
             <a:fld id="{D3250C7F-393C-42B5-920A-81DE1868480F}" type="datetimeFigureOut">
               <a:rPr lang="en-US" smtClean="0"/>
-              <a:t>24-Nov-23</a:t>
+              <a:t>26-Nov-23</a:t>
             </a:fld>
             <a:endParaRPr lang="en-US"/>
           </a:p>
@@ -1149,7 +1150,7 @@
           <a:p>
             <a:fld id="{D3250C7F-393C-42B5-920A-81DE1868480F}" type="datetimeFigureOut">
               <a:rPr lang="en-US" smtClean="0"/>
-              <a:t>24-Nov-23</a:t>
+              <a:t>26-Nov-23</a:t>
             </a:fld>
             <a:endParaRPr lang="en-US"/>
           </a:p>
@@ -1414,7 +1415,7 @@
           <a:p>
             <a:fld id="{D3250C7F-393C-42B5-920A-81DE1868480F}" type="datetimeFigureOut">
               <a:rPr lang="en-US" smtClean="0"/>
-              <a:t>24-Nov-23</a:t>
+              <a:t>26-Nov-23</a:t>
             </a:fld>
             <a:endParaRPr lang="en-US"/>
           </a:p>
@@ -1826,7 +1827,7 @@
           <a:p>
             <a:fld id="{D3250C7F-393C-42B5-920A-81DE1868480F}" type="datetimeFigureOut">
               <a:rPr lang="en-US" smtClean="0"/>
-              <a:t>24-Nov-23</a:t>
+              <a:t>26-Nov-23</a:t>
             </a:fld>
             <a:endParaRPr lang="en-US"/>
           </a:p>
@@ -1967,7 +1968,7 @@
           <a:p>
             <a:fld id="{D3250C7F-393C-42B5-920A-81DE1868480F}" type="datetimeFigureOut">
               <a:rPr lang="en-US" smtClean="0"/>
-              <a:t>24-Nov-23</a:t>
+              <a:t>26-Nov-23</a:t>
             </a:fld>
             <a:endParaRPr lang="en-US"/>
           </a:p>
@@ -2080,7 +2081,7 @@
           <a:p>
             <a:fld id="{D3250C7F-393C-42B5-920A-81DE1868480F}" type="datetimeFigureOut">
               <a:rPr lang="en-US" smtClean="0"/>
-              <a:t>24-Nov-23</a:t>
+              <a:t>26-Nov-23</a:t>
             </a:fld>
             <a:endParaRPr lang="en-US"/>
           </a:p>
@@ -2391,7 +2392,7 @@
           <a:p>
             <a:fld id="{D3250C7F-393C-42B5-920A-81DE1868480F}" type="datetimeFigureOut">
               <a:rPr lang="en-US" smtClean="0"/>
-              <a:t>24-Nov-23</a:t>
+              <a:t>26-Nov-23</a:t>
             </a:fld>
             <a:endParaRPr lang="en-US"/>
           </a:p>
@@ -2679,7 +2680,7 @@
           <a:p>
             <a:fld id="{D3250C7F-393C-42B5-920A-81DE1868480F}" type="datetimeFigureOut">
               <a:rPr lang="en-US" smtClean="0"/>
-              <a:t>24-Nov-23</a:t>
+              <a:t>26-Nov-23</a:t>
             </a:fld>
             <a:endParaRPr lang="en-US"/>
           </a:p>
@@ -2920,7 +2921,7 @@
           <a:p>
             <a:fld id="{D3250C7F-393C-42B5-920A-81DE1868480F}" type="datetimeFigureOut">
               <a:rPr lang="en-US" smtClean="0"/>
-              <a:t>24-Nov-23</a:t>
+              <a:t>26-Nov-23</a:t>
             </a:fld>
             <a:endParaRPr lang="en-US"/>
           </a:p>
@@ -3428,7 +3429,7 @@
           <p:cNvPr id="2" name="Title 1">
             <a:extLst>
               <a:ext uri="{FF2B5EF4-FFF2-40B4-BE49-F238E27FC236}">
-                <a16:creationId xmlns:a16="http://schemas.microsoft.com/office/drawing/2014/main" id="{4F85EC2E-B1DC-1036-1B14-74AEF2778825}"/>
+                <a16:creationId xmlns:a16="http://schemas.microsoft.com/office/drawing/2014/main" id="{E57BF076-2D40-F0B0-E0FB-A080FFC3A6B1}"/>
               </a:ext>
             </a:extLst>
           </p:cNvPr>
@@ -3441,12 +3442,21 @@
         </p:nvSpPr>
         <p:spPr/>
         <p:txBody>
-          <a:bodyPr/>
-          <a:lstStyle/>
-          <a:p>
-            <a:r>
-              <a:rPr lang="en-US" dirty="0"/>
-              <a:t>Model Selection - Big</a:t>
+          <a:bodyPr>
+            <a:normAutofit fontScale="90000"/>
+          </a:bodyPr>
+          <a:lstStyle/>
+          <a:p>
+            <a:r>
+              <a:rPr lang="en-US" dirty="0"/>
+              <a:t>Feature Selection &amp; Engineering</a:t>
+            </a:r>
+            <a:br>
+              <a:rPr lang="en-US" dirty="0"/>
+            </a:br>
+            <a:r>
+              <a:rPr lang="en-US" dirty="0"/>
+              <a:t>Train data – West Nile virus presence proportion</a:t>
             </a:r>
           </a:p>
         </p:txBody>
@@ -3456,7 +3466,7 @@
           <p:cNvPr id="3" name="Content Placeholder 2">
             <a:extLst>
               <a:ext uri="{FF2B5EF4-FFF2-40B4-BE49-F238E27FC236}">
-                <a16:creationId xmlns:a16="http://schemas.microsoft.com/office/drawing/2014/main" id="{C7C18EC8-7875-051F-CF22-E86FB620AA41}"/>
+                <a16:creationId xmlns:a16="http://schemas.microsoft.com/office/drawing/2014/main" id="{200EBEBA-D172-B710-E45A-898D0F4C1911}"/>
               </a:ext>
             </a:extLst>
           </p:cNvPr>
@@ -3474,34 +3484,111 @@
           <a:p>
             <a:r>
               <a:rPr lang="en-US" dirty="0"/>
-              <a:t>Scoring method</a:t>
-            </a:r>
-          </a:p>
-          <a:p>
-            <a:r>
-              <a:rPr lang="en-US" dirty="0"/>
-              <a:t>Error analysis</a:t>
-            </a:r>
-          </a:p>
-          <a:p>
+              <a:t>Calculate the number of records by species, location (</a:t>
+            </a:r>
             <a:r>
               <a:rPr lang="en-US" dirty="0" err="1"/>
-              <a:t>Gridsearch</a:t>
-            </a:r>
-            <a:endParaRPr lang="en-US" dirty="0"/>
-          </a:p>
-          <a:p>
-            <a:r>
-              <a:rPr lang="en-US" dirty="0"/>
-              <a:t>Selected model</a:t>
-            </a:r>
+              <a:t>lat</a:t>
+            </a:r>
+            <a:r>
+              <a:rPr lang="en-US" dirty="0"/>
+              <a:t>/long) and week of year</a:t>
+            </a:r>
+          </a:p>
+          <a:p>
+            <a:r>
+              <a:rPr lang="en-US" dirty="0"/>
+              <a:t>From the number of records, using the average number of records to calculate proportion</a:t>
+            </a:r>
+          </a:p>
+        </p:txBody>
+      </p:sp>
+      <p:pic>
+        <p:nvPicPr>
+          <p:cNvPr id="5" name="Picture 4">
+            <a:extLst>
+              <a:ext uri="{FF2B5EF4-FFF2-40B4-BE49-F238E27FC236}">
+                <a16:creationId xmlns:a16="http://schemas.microsoft.com/office/drawing/2014/main" id="{273E5021-A33E-7F9F-51FE-DE583C1C87AD}"/>
+              </a:ext>
+            </a:extLst>
+          </p:cNvPr>
+          <p:cNvPicPr>
+            <a:picLocks noChangeAspect="1"/>
+          </p:cNvPicPr>
+          <p:nvPr/>
+        </p:nvPicPr>
+        <p:blipFill>
+          <a:blip r:embed="rId2"/>
+          <a:stretch>
+            <a:fillRect/>
+          </a:stretch>
+        </p:blipFill>
+        <p:spPr>
+          <a:xfrm>
+            <a:off x="4371001" y="3308753"/>
+            <a:ext cx="6982799" cy="3115110"/>
+          </a:xfrm>
+          <a:prstGeom prst="rect">
+            <a:avLst/>
+          </a:prstGeom>
+        </p:spPr>
+      </p:pic>
+      <p:sp>
+        <p:nvSpPr>
+          <p:cNvPr id="6" name="Rectangle 5">
+            <a:extLst>
+              <a:ext uri="{FF2B5EF4-FFF2-40B4-BE49-F238E27FC236}">
+                <a16:creationId xmlns:a16="http://schemas.microsoft.com/office/drawing/2014/main" id="{FE0F7851-26DF-20E8-C26A-E5F460C0803C}"/>
+              </a:ext>
+            </a:extLst>
+          </p:cNvPr>
+          <p:cNvSpPr/>
+          <p:nvPr/>
+        </p:nvSpPr>
+        <p:spPr>
+          <a:xfrm>
+            <a:off x="8410755" y="3308753"/>
+            <a:ext cx="2943045" cy="3115110"/>
+          </a:xfrm>
+          <a:prstGeom prst="rect">
+            <a:avLst/>
+          </a:prstGeom>
+          <a:noFill/>
+          <a:ln w="28575">
+            <a:solidFill>
+              <a:srgbClr val="FF0000"/>
+            </a:solidFill>
+          </a:ln>
+        </p:spPr>
+        <p:style>
+          <a:lnRef idx="2">
+            <a:schemeClr val="accent1">
+              <a:shade val="15000"/>
+            </a:schemeClr>
+          </a:lnRef>
+          <a:fillRef idx="1">
+            <a:schemeClr val="accent1"/>
+          </a:fillRef>
+          <a:effectRef idx="0">
+            <a:schemeClr val="accent1"/>
+          </a:effectRef>
+          <a:fontRef idx="minor">
+            <a:schemeClr val="lt1"/>
+          </a:fontRef>
+        </p:style>
+        <p:txBody>
+          <a:bodyPr rtlCol="0" anchor="ctr"/>
+          <a:lstStyle/>
+          <a:p>
+            <a:pPr algn="ctr"/>
+            <a:endParaRPr lang="en-US"/>
           </a:p>
         </p:txBody>
       </p:sp>
     </p:spTree>
     <p:extLst>
       <p:ext uri="{BB962C8B-B14F-4D97-AF65-F5344CB8AC3E}">
-        <p14:creationId xmlns:p14="http://schemas.microsoft.com/office/powerpoint/2010/main" val="3396090521"/>
+        <p14:creationId xmlns:p14="http://schemas.microsoft.com/office/powerpoint/2010/main" val="3616796786"/>
       </p:ext>
     </p:extLst>
   </p:cSld>
@@ -3533,6 +3620,111 @@
           <p:cNvPr id="2" name="Title 1">
             <a:extLst>
               <a:ext uri="{FF2B5EF4-FFF2-40B4-BE49-F238E27FC236}">
+                <a16:creationId xmlns:a16="http://schemas.microsoft.com/office/drawing/2014/main" id="{4F85EC2E-B1DC-1036-1B14-74AEF2778825}"/>
+              </a:ext>
+            </a:extLst>
+          </p:cNvPr>
+          <p:cNvSpPr>
+            <a:spLocks noGrp="1"/>
+          </p:cNvSpPr>
+          <p:nvPr>
+            <p:ph type="title"/>
+          </p:nvPr>
+        </p:nvSpPr>
+        <p:spPr/>
+        <p:txBody>
+          <a:bodyPr/>
+          <a:lstStyle/>
+          <a:p>
+            <a:r>
+              <a:rPr lang="en-US" dirty="0"/>
+              <a:t>Model Selection - Big</a:t>
+            </a:r>
+          </a:p>
+        </p:txBody>
+      </p:sp>
+      <p:sp>
+        <p:nvSpPr>
+          <p:cNvPr id="3" name="Content Placeholder 2">
+            <a:extLst>
+              <a:ext uri="{FF2B5EF4-FFF2-40B4-BE49-F238E27FC236}">
+                <a16:creationId xmlns:a16="http://schemas.microsoft.com/office/drawing/2014/main" id="{C7C18EC8-7875-051F-CF22-E86FB620AA41}"/>
+              </a:ext>
+            </a:extLst>
+          </p:cNvPr>
+          <p:cNvSpPr>
+            <a:spLocks noGrp="1"/>
+          </p:cNvSpPr>
+          <p:nvPr>
+            <p:ph idx="1"/>
+          </p:nvPr>
+        </p:nvSpPr>
+        <p:spPr/>
+        <p:txBody>
+          <a:bodyPr/>
+          <a:lstStyle/>
+          <a:p>
+            <a:r>
+              <a:rPr lang="en-US" dirty="0"/>
+              <a:t>Scoring method</a:t>
+            </a:r>
+          </a:p>
+          <a:p>
+            <a:r>
+              <a:rPr lang="en-US" dirty="0"/>
+              <a:t>Error analysis</a:t>
+            </a:r>
+          </a:p>
+          <a:p>
+            <a:r>
+              <a:rPr lang="en-US" dirty="0" err="1"/>
+              <a:t>Gridsearch</a:t>
+            </a:r>
+            <a:endParaRPr lang="en-US" dirty="0"/>
+          </a:p>
+          <a:p>
+            <a:r>
+              <a:rPr lang="en-US" dirty="0"/>
+              <a:t>Selected model</a:t>
+            </a:r>
+          </a:p>
+        </p:txBody>
+      </p:sp>
+    </p:spTree>
+    <p:extLst>
+      <p:ext uri="{BB962C8B-B14F-4D97-AF65-F5344CB8AC3E}">
+        <p14:creationId xmlns:p14="http://schemas.microsoft.com/office/powerpoint/2010/main" val="3396090521"/>
+      </p:ext>
+    </p:extLst>
+  </p:cSld>
+  <p:clrMapOvr>
+    <a:masterClrMapping/>
+  </p:clrMapOvr>
+</p:sld>
+</file>
+
+<file path=ppt/slides/slide12.xml><?xml version="1.0" encoding="utf-8"?>
+<p:sld xmlns:a="http://schemas.openxmlformats.org/drawingml/2006/main" xmlns:r="http://schemas.openxmlformats.org/officeDocument/2006/relationships" xmlns:p="http://schemas.openxmlformats.org/presentationml/2006/main">
+  <p:cSld>
+    <p:spTree>
+      <p:nvGrpSpPr>
+        <p:cNvPr id="1" name=""/>
+        <p:cNvGrpSpPr/>
+        <p:nvPr/>
+      </p:nvGrpSpPr>
+      <p:grpSpPr>
+        <a:xfrm>
+          <a:off x="0" y="0"/>
+          <a:ext cx="0" cy="0"/>
+          <a:chOff x="0" y="0"/>
+          <a:chExt cx="0" cy="0"/>
+        </a:xfrm>
+      </p:grpSpPr>
+      <p:sp>
+        <p:nvSpPr>
+          <p:cNvPr id="2" name="Title 1">
+            <a:extLst>
+              <a:ext uri="{FF2B5EF4-FFF2-40B4-BE49-F238E27FC236}">
                 <a16:creationId xmlns:a16="http://schemas.microsoft.com/office/drawing/2014/main" id="{EB7DAB54-2517-C97F-DCEE-CCC43DB85A66}"/>
               </a:ext>
             </a:extLst>
@@ -3606,10 +3798,10 @@
       </p:sp>
       <p:pic>
         <p:nvPicPr>
-          <p:cNvPr id="5" name="Picture 4">
-            <a:extLst>
-              <a:ext uri="{FF2B5EF4-FFF2-40B4-BE49-F238E27FC236}">
-                <a16:creationId xmlns:a16="http://schemas.microsoft.com/office/drawing/2014/main" id="{FF945AB3-4BD3-2D69-0AFC-BD394637289A}"/>
+          <p:cNvPr id="8" name="Picture 7">
+            <a:extLst>
+              <a:ext uri="{FF2B5EF4-FFF2-40B4-BE49-F238E27FC236}">
+                <a16:creationId xmlns:a16="http://schemas.microsoft.com/office/drawing/2014/main" id="{FA9F48F8-98AD-EE9C-E3B6-64F782E86E6F}"/>
               </a:ext>
             </a:extLst>
           </p:cNvPr>
@@ -3626,8 +3818,8 @@
         </p:blipFill>
         <p:spPr>
           <a:xfrm>
-            <a:off x="8178323" y="1502178"/>
-            <a:ext cx="2971878" cy="3853644"/>
+            <a:off x="8139202" y="1347787"/>
+            <a:ext cx="3228975" cy="4162425"/>
           </a:xfrm>
           <a:prstGeom prst="rect">
             <a:avLst/>
@@ -3647,7 +3839,7 @@
 </p:sld>
 </file>
 
-<file path=ppt/slides/slide12.xml><?xml version="1.0" encoding="utf-8"?>
+<file path=ppt/slides/slide13.xml><?xml version="1.0" encoding="utf-8"?>
 <p:sld xmlns:a="http://schemas.openxmlformats.org/drawingml/2006/main" xmlns:r="http://schemas.openxmlformats.org/officeDocument/2006/relationships" xmlns:p="http://schemas.openxmlformats.org/presentationml/2006/main">
   <p:cSld>
     <p:spTree>
@@ -4278,13 +4470,8 @@
             <a:pPr lvl="1"/>
             <a:r>
               <a:rPr lang="en-US" dirty="0"/>
-              <a:t>Average Wind </a:t>
-            </a:r>
-            <a:r>
-              <a:rPr lang="en-US" dirty="0" err="1"/>
-              <a:t>Spee</a:t>
-            </a:r>
-            <a:endParaRPr lang="en-US" dirty="0"/>
+              <a:t>Average Wind Speed</a:t>
+            </a:r>
           </a:p>
           <a:p>
             <a:pPr lvl="1"/>
@@ -4361,6 +4548,110 @@
           </a:prstGeom>
         </p:spPr>
       </p:pic>
+      <p:sp>
+        <p:nvSpPr>
+          <p:cNvPr id="3" name="Rectangle 2">
+            <a:extLst>
+              <a:ext uri="{FF2B5EF4-FFF2-40B4-BE49-F238E27FC236}">
+                <a16:creationId xmlns:a16="http://schemas.microsoft.com/office/drawing/2014/main" id="{6BF48715-65E5-D8FB-50A7-3107A54F6607}"/>
+              </a:ext>
+            </a:extLst>
+          </p:cNvPr>
+          <p:cNvSpPr/>
+          <p:nvPr/>
+        </p:nvSpPr>
+        <p:spPr>
+          <a:xfrm>
+            <a:off x="8894703" y="402759"/>
+            <a:ext cx="2942573" cy="3113361"/>
+          </a:xfrm>
+          <a:prstGeom prst="rect">
+            <a:avLst/>
+          </a:prstGeom>
+          <a:noFill/>
+          <a:ln w="28575">
+            <a:solidFill>
+              <a:srgbClr val="FF0000"/>
+            </a:solidFill>
+          </a:ln>
+        </p:spPr>
+        <p:style>
+          <a:lnRef idx="2">
+            <a:schemeClr val="accent1">
+              <a:shade val="15000"/>
+            </a:schemeClr>
+          </a:lnRef>
+          <a:fillRef idx="1">
+            <a:schemeClr val="accent1"/>
+          </a:fillRef>
+          <a:effectRef idx="0">
+            <a:schemeClr val="accent1"/>
+          </a:effectRef>
+          <a:fontRef idx="minor">
+            <a:schemeClr val="lt1"/>
+          </a:fontRef>
+        </p:style>
+        <p:txBody>
+          <a:bodyPr rtlCol="0" anchor="ctr"/>
+          <a:lstStyle/>
+          <a:p>
+            <a:pPr algn="ctr"/>
+            <a:endParaRPr lang="en-US"/>
+          </a:p>
+        </p:txBody>
+      </p:sp>
+      <p:sp>
+        <p:nvSpPr>
+          <p:cNvPr id="4" name="Rectangle 3">
+            <a:extLst>
+              <a:ext uri="{FF2B5EF4-FFF2-40B4-BE49-F238E27FC236}">
+                <a16:creationId xmlns:a16="http://schemas.microsoft.com/office/drawing/2014/main" id="{78E2E884-24C7-1276-3899-EE2A30373431}"/>
+              </a:ext>
+            </a:extLst>
+          </p:cNvPr>
+          <p:cNvSpPr/>
+          <p:nvPr/>
+        </p:nvSpPr>
+        <p:spPr>
+          <a:xfrm>
+            <a:off x="2841491" y="3624699"/>
+            <a:ext cx="2981339" cy="3154473"/>
+          </a:xfrm>
+          <a:prstGeom prst="rect">
+            <a:avLst/>
+          </a:prstGeom>
+          <a:noFill/>
+          <a:ln w="28575">
+            <a:solidFill>
+              <a:srgbClr val="FF0000"/>
+            </a:solidFill>
+          </a:ln>
+        </p:spPr>
+        <p:style>
+          <a:lnRef idx="2">
+            <a:schemeClr val="accent1">
+              <a:shade val="15000"/>
+            </a:schemeClr>
+          </a:lnRef>
+          <a:fillRef idx="1">
+            <a:schemeClr val="accent1"/>
+          </a:fillRef>
+          <a:effectRef idx="0">
+            <a:schemeClr val="accent1"/>
+          </a:effectRef>
+          <a:fontRef idx="minor">
+            <a:schemeClr val="lt1"/>
+          </a:fontRef>
+        </p:style>
+        <p:txBody>
+          <a:bodyPr rtlCol="0" anchor="ctr"/>
+          <a:lstStyle/>
+          <a:p>
+            <a:pPr algn="ctr"/>
+            <a:endParaRPr lang="en-US"/>
+          </a:p>
+        </p:txBody>
+      </p:sp>
     </p:spTree>
     <p:extLst>
       <p:ext uri="{BB962C8B-B14F-4D97-AF65-F5344CB8AC3E}">
@@ -4947,13 +5238,7 @@
           <a:p>
             <a:r>
               <a:rPr lang="en-US" dirty="0"/>
-              <a:t>Number of records from previous week</a:t>
-            </a:r>
-          </a:p>
-          <a:p>
-            <a:r>
-              <a:rPr lang="en-US" dirty="0"/>
-              <a:t>Difference of this number</a:t>
+              <a:t>Difference of number of records from previous and current week</a:t>
             </a:r>
           </a:p>
           <a:p>

</xml_diff>